<commit_message>
#0 DTO수정, REST URI 수정
</commit_message>
<xml_diff>
--- a/공유폴더/화면구상종합.pptx
+++ b/공유폴더/화면구상종합.pptx
@@ -210,7 +210,7 @@
           <a:p>
             <a:fld id="{D823AACF-5D40-FD4E-9178-1D5234D86A71}" type="datetimeFigureOut">
               <a:rPr kumimoji="1" lang="ko-US" altLang="en-US" smtClean="0"/>
-              <a:t>08/20/2021</a:t>
+              <a:t>08/21/2021</a:t>
             </a:fld>
             <a:endParaRPr kumimoji="1" lang="ko-US" altLang="en-US"/>
           </a:p>
@@ -6392,134 +6392,763 @@
           </a:p>
           <a:p>
             <a:r>
-              <a:rPr lang="en-US" altLang="ko-KR" dirty="0"/>
-              <a:t>MVC</a:t>
-            </a:r>
-            <a:r>
-              <a:rPr lang="ko-KR" altLang="en-US" dirty="0"/>
-              <a:t>방식이 아니라 </a:t>
-            </a:r>
-            <a:r>
-              <a:rPr lang="en-US" altLang="ko-KR" dirty="0"/>
-              <a:t>REST, </a:t>
-            </a:r>
-            <a:r>
-              <a:rPr lang="ko-KR" altLang="en-US" dirty="0"/>
-              <a:t>백 프론트 분리방식으로 </a:t>
-            </a:r>
-            <a:r>
-              <a:rPr lang="ko-KR" altLang="en-US" dirty="0" err="1"/>
-              <a:t>할예정인데</a:t>
-            </a:r>
-            <a:endParaRPr lang="en-US" altLang="ko-KR" dirty="0"/>
-          </a:p>
-          <a:p>
-            <a:r>
-              <a:rPr lang="ko-KR" altLang="en-US" dirty="0"/>
-              <a:t>한페이지에 계속 프로젝트를 </a:t>
-            </a:r>
-            <a:r>
-              <a:rPr lang="ko-KR" altLang="en-US" dirty="0" err="1"/>
-              <a:t>누적시키는게</a:t>
-            </a:r>
-            <a:r>
-              <a:rPr lang="ko-KR" altLang="en-US" dirty="0"/>
+              <a:rPr lang="ko-KR" altLang="en-US" sz="1800" dirty="0">
+                <a:solidFill>
+                  <a:srgbClr val="3F7F5F"/>
+                </a:solidFill>
+                <a:latin typeface="Consolas" panose="020B0609020204030204" pitchFamily="49" charset="0"/>
+              </a:rPr>
               <a:t> </a:t>
             </a:r>
             <a:r>
-              <a:rPr lang="ko-KR" altLang="en-US" dirty="0" err="1"/>
-              <a:t>자연스러워보여서요</a:t>
-            </a:r>
-            <a:r>
-              <a:rPr lang="ko-KR" altLang="en-US" dirty="0"/>
+              <a:rPr lang="en-US" altLang="ko-KR" sz="1800" dirty="0">
+                <a:solidFill>
+                  <a:srgbClr val="3F7F5F"/>
+                </a:solidFill>
+                <a:latin typeface="Consolas" panose="020B0609020204030204" pitchFamily="49" charset="0"/>
+              </a:rPr>
+              <a:t>0:</a:t>
+            </a:r>
+            <a:r>
+              <a:rPr lang="ko-KR" altLang="en-US" sz="1800" dirty="0">
+                <a:solidFill>
+                  <a:srgbClr val="3F7F5F"/>
+                </a:solidFill>
+                <a:latin typeface="Consolas" panose="020B0609020204030204" pitchFamily="49" charset="0"/>
+              </a:rPr>
+              <a:t>전체 </a:t>
+            </a:r>
+            <a:r>
+              <a:rPr lang="en-US" altLang="ko-KR" sz="1800" dirty="0">
+                <a:solidFill>
+                  <a:srgbClr val="3F7F5F"/>
+                </a:solidFill>
+                <a:latin typeface="Consolas" panose="020B0609020204030204" pitchFamily="49" charset="0"/>
+              </a:rPr>
+              <a:t>1:</a:t>
+            </a:r>
+            <a:r>
+              <a:rPr lang="ko-KR" altLang="en-US" sz="1800" dirty="0">
+                <a:solidFill>
+                  <a:srgbClr val="3F7F5F"/>
+                </a:solidFill>
+                <a:latin typeface="Consolas" panose="020B0609020204030204" pitchFamily="49" charset="0"/>
+              </a:rPr>
+              <a:t>캔들 </a:t>
+            </a:r>
+            <a:r>
+              <a:rPr lang="en-US" altLang="ko-KR" sz="1800" dirty="0">
+                <a:solidFill>
+                  <a:srgbClr val="3F7F5F"/>
+                </a:solidFill>
+                <a:latin typeface="Consolas" panose="020B0609020204030204" pitchFamily="49" charset="0"/>
+              </a:rPr>
+              <a:t>2:</a:t>
+            </a:r>
+            <a:r>
+              <a:rPr lang="ko-KR" altLang="en-US" sz="1800" dirty="0" err="1">
+                <a:solidFill>
+                  <a:srgbClr val="3F7F5F"/>
+                </a:solidFill>
+                <a:latin typeface="Consolas" panose="020B0609020204030204" pitchFamily="49" charset="0"/>
+              </a:rPr>
+              <a:t>조향</a:t>
+            </a:r>
+            <a:r>
+              <a:rPr lang="ko-KR" altLang="en-US" sz="1800" dirty="0">
+                <a:solidFill>
+                  <a:srgbClr val="3F7F5F"/>
+                </a:solidFill>
+                <a:latin typeface="Consolas" panose="020B0609020204030204" pitchFamily="49" charset="0"/>
+              </a:rPr>
               <a:t> </a:t>
             </a:r>
-            <a:endParaRPr lang="en-US" altLang="ko-KR" dirty="0"/>
-          </a:p>
-          <a:p>
-            <a:r>
-              <a:rPr lang="ko-KR" altLang="en-US" dirty="0"/>
+            <a:r>
+              <a:rPr lang="en-US" altLang="ko-KR" sz="1800" dirty="0">
+                <a:solidFill>
+                  <a:srgbClr val="3F7F5F"/>
+                </a:solidFill>
+                <a:latin typeface="Consolas" panose="020B0609020204030204" pitchFamily="49" charset="0"/>
+              </a:rPr>
+              <a:t>3:</a:t>
+            </a:r>
+            <a:r>
+              <a:rPr lang="ko-KR" altLang="en-US" sz="1800" dirty="0">
+                <a:solidFill>
+                  <a:srgbClr val="3F7F5F"/>
+                </a:solidFill>
+                <a:latin typeface="Consolas" panose="020B0609020204030204" pitchFamily="49" charset="0"/>
+              </a:rPr>
+              <a:t>비누 </a:t>
+            </a:r>
+            <a:r>
+              <a:rPr lang="en-US" altLang="ko-KR" sz="1800" dirty="0">
+                <a:solidFill>
+                  <a:srgbClr val="3F7F5F"/>
+                </a:solidFill>
+                <a:latin typeface="Consolas" panose="020B0609020204030204" pitchFamily="49" charset="0"/>
+              </a:rPr>
+              <a:t>4:</a:t>
+            </a:r>
+            <a:r>
+              <a:rPr lang="ko-KR" altLang="en-US" sz="1800" dirty="0">
+                <a:solidFill>
+                  <a:srgbClr val="3F7F5F"/>
+                </a:solidFill>
+                <a:latin typeface="Consolas" panose="020B0609020204030204" pitchFamily="49" charset="0"/>
+              </a:rPr>
+              <a:t>도예 </a:t>
+            </a:r>
+            <a:r>
+              <a:rPr lang="en-US" altLang="ko-KR" sz="1800" dirty="0">
+                <a:solidFill>
+                  <a:srgbClr val="3F7F5F"/>
+                </a:solidFill>
+                <a:latin typeface="Consolas" panose="020B0609020204030204" pitchFamily="49" charset="0"/>
+              </a:rPr>
+              <a:t>5:</a:t>
+            </a:r>
+            <a:r>
+              <a:rPr lang="ko-KR" altLang="en-US" sz="1800" dirty="0">
+                <a:solidFill>
+                  <a:srgbClr val="3F7F5F"/>
+                </a:solidFill>
+                <a:latin typeface="Consolas" panose="020B0609020204030204" pitchFamily="49" charset="0"/>
+              </a:rPr>
+              <a:t>섬유</a:t>
+            </a:r>
+            <a:r>
+              <a:rPr lang="en-US" altLang="ko-KR" sz="1800" dirty="0">
+                <a:solidFill>
+                  <a:srgbClr val="3F7F5F"/>
+                </a:solidFill>
+                <a:latin typeface="Consolas" panose="020B0609020204030204" pitchFamily="49" charset="0"/>
+              </a:rPr>
+              <a:t>,</a:t>
+            </a:r>
+            <a:r>
+              <a:rPr lang="ko-KR" altLang="en-US" sz="1800" dirty="0">
+                <a:solidFill>
+                  <a:srgbClr val="3F7F5F"/>
+                </a:solidFill>
+                <a:latin typeface="Consolas" panose="020B0609020204030204" pitchFamily="49" charset="0"/>
+              </a:rPr>
+              <a:t>자수</a:t>
+            </a:r>
+            <a:endParaRPr lang="en-US" altLang="ko-KR" sz="1800" dirty="0">
+              <a:solidFill>
+                <a:srgbClr val="3F7F5F"/>
+              </a:solidFill>
+              <a:latin typeface="Consolas" panose="020B0609020204030204" pitchFamily="49" charset="0"/>
+            </a:endParaRPr>
+          </a:p>
+          <a:p>
+            <a:r>
+              <a:rPr lang="en-US" altLang="ko-KR" sz="1800" dirty="0">
+                <a:solidFill>
+                  <a:srgbClr val="3F7F5F"/>
+                </a:solidFill>
+                <a:latin typeface="Consolas" panose="020B0609020204030204" pitchFamily="49" charset="0"/>
+              </a:rPr>
+              <a:t>0:</a:t>
+            </a:r>
+            <a:r>
+              <a:rPr lang="ko-KR" altLang="en-US" sz="1800" dirty="0">
+                <a:solidFill>
+                  <a:srgbClr val="3F7F5F"/>
+                </a:solidFill>
+                <a:latin typeface="Consolas" panose="020B0609020204030204" pitchFamily="49" charset="0"/>
+              </a:rPr>
+              <a:t>전체</a:t>
+            </a:r>
+            <a:r>
+              <a:rPr lang="en-US" altLang="ko-KR" sz="1800" dirty="0">
+                <a:solidFill>
+                  <a:srgbClr val="3F7F5F"/>
+                </a:solidFill>
+                <a:latin typeface="Consolas" panose="020B0609020204030204" pitchFamily="49" charset="0"/>
+              </a:rPr>
+              <a:t>1:</a:t>
+            </a:r>
+            <a:r>
+              <a:rPr lang="ko-KR" altLang="en-US" sz="1800" dirty="0">
+                <a:solidFill>
+                  <a:srgbClr val="3F7F5F"/>
+                </a:solidFill>
+                <a:latin typeface="Consolas" panose="020B0609020204030204" pitchFamily="49" charset="0"/>
+              </a:rPr>
+              <a:t>진행예정 </a:t>
+            </a:r>
+            <a:r>
+              <a:rPr lang="en-US" altLang="ko-KR" sz="1800" dirty="0">
+                <a:solidFill>
+                  <a:srgbClr val="3F7F5F"/>
+                </a:solidFill>
+                <a:latin typeface="Consolas" panose="020B0609020204030204" pitchFamily="49" charset="0"/>
+              </a:rPr>
+              <a:t>2:</a:t>
+            </a:r>
+            <a:r>
+              <a:rPr lang="ko-KR" altLang="en-US" sz="1800" dirty="0">
+                <a:solidFill>
+                  <a:srgbClr val="3F7F5F"/>
+                </a:solidFill>
+                <a:latin typeface="Consolas" panose="020B0609020204030204" pitchFamily="49" charset="0"/>
+              </a:rPr>
+              <a:t>진행중 </a:t>
+            </a:r>
+            <a:r>
+              <a:rPr lang="en-US" altLang="ko-KR" sz="1800" dirty="0">
+                <a:solidFill>
+                  <a:srgbClr val="3F7F5F"/>
+                </a:solidFill>
+                <a:latin typeface="Consolas" panose="020B0609020204030204" pitchFamily="49" charset="0"/>
+              </a:rPr>
+              <a:t>3:</a:t>
+            </a:r>
+            <a:r>
+              <a:rPr lang="ko-KR" altLang="en-US" sz="1800" dirty="0">
+                <a:solidFill>
+                  <a:srgbClr val="3F7F5F"/>
+                </a:solidFill>
+                <a:latin typeface="Consolas" panose="020B0609020204030204" pitchFamily="49" charset="0"/>
+              </a:rPr>
+              <a:t>마감</a:t>
+            </a:r>
+            <a:r>
+              <a:rPr lang="en-US" altLang="ko-KR" sz="1800" dirty="0">
+                <a:solidFill>
+                  <a:srgbClr val="3F7F5F"/>
+                </a:solidFill>
+                <a:latin typeface="Consolas" panose="020B0609020204030204" pitchFamily="49" charset="0"/>
+              </a:rPr>
+              <a:t>(</a:t>
+            </a:r>
+            <a:r>
+              <a:rPr lang="ko-KR" altLang="en-US" sz="1800" dirty="0">
+                <a:solidFill>
+                  <a:srgbClr val="3F7F5F"/>
+                </a:solidFill>
+                <a:latin typeface="Consolas" panose="020B0609020204030204" pitchFamily="49" charset="0"/>
+              </a:rPr>
+              <a:t>성공</a:t>
+            </a:r>
+            <a:r>
+              <a:rPr lang="en-US" altLang="ko-KR" sz="1800" dirty="0">
+                <a:solidFill>
+                  <a:srgbClr val="3F7F5F"/>
+                </a:solidFill>
+                <a:latin typeface="Consolas" panose="020B0609020204030204" pitchFamily="49" charset="0"/>
+              </a:rPr>
+              <a:t>+</a:t>
+            </a:r>
+            <a:r>
+              <a:rPr lang="ko-KR" altLang="en-US" sz="1800" dirty="0">
+                <a:solidFill>
+                  <a:srgbClr val="3F7F5F"/>
+                </a:solidFill>
+                <a:latin typeface="Consolas" panose="020B0609020204030204" pitchFamily="49" charset="0"/>
+              </a:rPr>
+              <a:t>실패</a:t>
+            </a:r>
+            <a:r>
+              <a:rPr lang="en-US" altLang="ko-KR" sz="1800" dirty="0">
+                <a:solidFill>
+                  <a:srgbClr val="3F7F5F"/>
+                </a:solidFill>
+                <a:latin typeface="Consolas" panose="020B0609020204030204" pitchFamily="49" charset="0"/>
+              </a:rPr>
+              <a:t>) </a:t>
+            </a:r>
+          </a:p>
+          <a:p>
+            <a:r>
+              <a:rPr lang="en-US" altLang="ko-KR" sz="1800" dirty="0">
+                <a:solidFill>
+                  <a:srgbClr val="3F7F5F"/>
+                </a:solidFill>
+                <a:latin typeface="Consolas" panose="020B0609020204030204" pitchFamily="49" charset="0"/>
+              </a:rPr>
+              <a:t>0:</a:t>
+            </a:r>
+            <a:r>
+              <a:rPr lang="ko-KR" altLang="en-US" sz="1800" dirty="0">
+                <a:solidFill>
+                  <a:srgbClr val="3F7F5F"/>
+                </a:solidFill>
+                <a:latin typeface="Consolas" panose="020B0609020204030204" pitchFamily="49" charset="0"/>
+              </a:rPr>
+              <a:t>전체</a:t>
+            </a:r>
+            <a:r>
+              <a:rPr lang="en-US" altLang="ko-KR" sz="1800" dirty="0">
+                <a:solidFill>
+                  <a:srgbClr val="3F7F5F"/>
+                </a:solidFill>
+                <a:latin typeface="Consolas" panose="020B0609020204030204" pitchFamily="49" charset="0"/>
+              </a:rPr>
+              <a:t>1:75%</a:t>
+            </a:r>
+            <a:r>
+              <a:rPr lang="ko-KR" altLang="en-US" sz="1800" dirty="0">
+                <a:solidFill>
+                  <a:srgbClr val="3F7F5F"/>
+                </a:solidFill>
+                <a:latin typeface="Consolas" panose="020B0609020204030204" pitchFamily="49" charset="0"/>
+              </a:rPr>
+              <a:t>이하 </a:t>
+            </a:r>
+            <a:r>
+              <a:rPr lang="en-US" altLang="ko-KR" sz="1800" dirty="0">
+                <a:solidFill>
+                  <a:srgbClr val="3F7F5F"/>
+                </a:solidFill>
+                <a:latin typeface="Consolas" panose="020B0609020204030204" pitchFamily="49" charset="0"/>
+              </a:rPr>
+              <a:t>2:75%~100% 3:100%</a:t>
+            </a:r>
+            <a:r>
+              <a:rPr lang="ko-KR" altLang="en-US" sz="1800" dirty="0">
+                <a:solidFill>
+                  <a:srgbClr val="3F7F5F"/>
+                </a:solidFill>
+                <a:latin typeface="Consolas" panose="020B0609020204030204" pitchFamily="49" charset="0"/>
+              </a:rPr>
+              <a:t>이상</a:t>
+            </a:r>
+            <a:endParaRPr lang="en-US" altLang="ko-KR" sz="1800" dirty="0">
+              <a:solidFill>
+                <a:srgbClr val="3F7F5F"/>
+              </a:solidFill>
+              <a:latin typeface="Consolas" panose="020B0609020204030204" pitchFamily="49" charset="0"/>
+            </a:endParaRPr>
+          </a:p>
+          <a:p>
+            <a:r>
+              <a:rPr lang="en-US" altLang="ko-KR" sz="1800" dirty="0">
+                <a:solidFill>
+                  <a:srgbClr val="3F7F5F"/>
+                </a:solidFill>
+                <a:latin typeface="Consolas" panose="020B0609020204030204" pitchFamily="49" charset="0"/>
+              </a:rPr>
+              <a:t>0:</a:t>
+            </a:r>
+            <a:r>
+              <a:rPr lang="ko-KR" altLang="en-US" sz="1800" dirty="0" err="1">
+                <a:solidFill>
+                  <a:srgbClr val="3F7F5F"/>
+                </a:solidFill>
+                <a:latin typeface="Consolas" panose="020B0609020204030204" pitchFamily="49" charset="0"/>
+              </a:rPr>
+              <a:t>인기순</a:t>
+            </a:r>
+            <a:r>
+              <a:rPr lang="ko-KR" altLang="en-US" sz="1800" dirty="0">
+                <a:solidFill>
+                  <a:srgbClr val="3F7F5F"/>
+                </a:solidFill>
+                <a:latin typeface="Consolas" panose="020B0609020204030204" pitchFamily="49" charset="0"/>
+              </a:rPr>
               <a:t> </a:t>
             </a:r>
-            <a:endParaRPr lang="en-US" altLang="ko-KR" dirty="0"/>
+            <a:r>
+              <a:rPr lang="en-US" altLang="ko-KR" sz="1800" dirty="0">
+                <a:solidFill>
+                  <a:srgbClr val="3F7F5F"/>
+                </a:solidFill>
+                <a:latin typeface="Consolas" panose="020B0609020204030204" pitchFamily="49" charset="0"/>
+              </a:rPr>
+              <a:t>1:</a:t>
+            </a:r>
+            <a:r>
+              <a:rPr lang="ko-KR" altLang="en-US" sz="1800" dirty="0" err="1">
+                <a:solidFill>
+                  <a:srgbClr val="3F7F5F"/>
+                </a:solidFill>
+                <a:latin typeface="Consolas" panose="020B0609020204030204" pitchFamily="49" charset="0"/>
+              </a:rPr>
+              <a:t>최신순</a:t>
+            </a:r>
+            <a:r>
+              <a:rPr lang="ko-KR" altLang="en-US" sz="1800" dirty="0">
+                <a:solidFill>
+                  <a:srgbClr val="3F7F5F"/>
+                </a:solidFill>
+                <a:latin typeface="Consolas" panose="020B0609020204030204" pitchFamily="49" charset="0"/>
+              </a:rPr>
+              <a:t> </a:t>
+            </a:r>
+            <a:r>
+              <a:rPr lang="en-US" altLang="ko-KR" sz="1800" dirty="0">
+                <a:solidFill>
+                  <a:srgbClr val="3F7F5F"/>
+                </a:solidFill>
+                <a:latin typeface="Consolas" panose="020B0609020204030204" pitchFamily="49" charset="0"/>
+              </a:rPr>
+              <a:t>2:</a:t>
+            </a:r>
+            <a:r>
+              <a:rPr lang="ko-KR" altLang="en-US" sz="1800" dirty="0" err="1">
+                <a:solidFill>
+                  <a:srgbClr val="3F7F5F"/>
+                </a:solidFill>
+                <a:latin typeface="Consolas" panose="020B0609020204030204" pitchFamily="49" charset="0"/>
+              </a:rPr>
+              <a:t>마감임박순</a:t>
+            </a:r>
+            <a:endParaRPr lang="en-US" altLang="ko-KR" sz="1800" dirty="0">
+              <a:solidFill>
+                <a:srgbClr val="3F7F5F"/>
+              </a:solidFill>
+              <a:latin typeface="Consolas" panose="020B0609020204030204" pitchFamily="49" charset="0"/>
+            </a:endParaRPr>
+          </a:p>
+          <a:p>
+            <a:endParaRPr lang="en-US" altLang="ko-KR" sz="1800" dirty="0">
+              <a:solidFill>
+                <a:srgbClr val="3F7F5F"/>
+              </a:solidFill>
+              <a:latin typeface="Consolas" panose="020B0609020204030204" pitchFamily="49" charset="0"/>
+            </a:endParaRPr>
           </a:p>
           <a:p>
             <a:pPr algn="l"/>
             <a:r>
-              <a:rPr lang="ko-KR" altLang="en-US" dirty="0" err="1"/>
-              <a:t>페이징</a:t>
-            </a:r>
-            <a:r>
-              <a:rPr lang="ko-KR" altLang="en-US" dirty="0"/>
-              <a:t> 처리보다 </a:t>
-            </a:r>
-            <a:r>
-              <a:rPr lang="ko-KR" altLang="en-US" dirty="0" err="1"/>
-              <a:t>제이쿼리로</a:t>
-            </a:r>
-            <a:r>
-              <a:rPr lang="ko-KR" altLang="en-US" dirty="0"/>
-              <a:t> 맨 밑으로 갔을 때</a:t>
-            </a:r>
-            <a:r>
-              <a:rPr lang="en-US" altLang="ko-KR" dirty="0"/>
-              <a:t>(</a:t>
-            </a:r>
-            <a:r>
-              <a:rPr lang="en-US" altLang="ko-KR" b="0" i="0" dirty="0">
-                <a:solidFill>
-                  <a:srgbClr val="5C5C5C"/>
-                </a:solidFill>
-                <a:effectLst/>
-                <a:latin typeface="Spoqa Han Sans"/>
-              </a:rPr>
-              <a:t> $(window).height() $(document).height() )</a:t>
+              <a:rPr lang="en-US" altLang="ko-KR" sz="1800" dirty="0">
+                <a:solidFill>
+                  <a:srgbClr val="3F7F5F"/>
+                </a:solidFill>
+                <a:latin typeface="Consolas" panose="020B0609020204030204" pitchFamily="49" charset="0"/>
+              </a:rPr>
+              <a:t>/* [</a:t>
+            </a:r>
+            <a:r>
+              <a:rPr lang="ko-KR" altLang="en-US" sz="1800" dirty="0" err="1">
+                <a:solidFill>
+                  <a:srgbClr val="3F7F5F"/>
+                </a:solidFill>
+                <a:latin typeface="Consolas" panose="020B0609020204030204" pitchFamily="49" charset="0"/>
+              </a:rPr>
+              <a:t>무한스크롤</a:t>
+            </a:r>
+            <a:r>
+              <a:rPr lang="en-US" altLang="ko-KR" sz="1800" dirty="0">
+                <a:solidFill>
+                  <a:srgbClr val="3F7F5F"/>
+                </a:solidFill>
+                <a:latin typeface="Consolas" panose="020B0609020204030204" pitchFamily="49" charset="0"/>
+              </a:rPr>
+              <a:t>] </a:t>
+            </a:r>
+            <a:r>
+              <a:rPr lang="ko-KR" altLang="en-US" sz="1800" dirty="0">
+                <a:solidFill>
+                  <a:srgbClr val="3F7F5F"/>
+                </a:solidFill>
+                <a:latin typeface="Consolas" panose="020B0609020204030204" pitchFamily="49" charset="0"/>
+              </a:rPr>
+              <a:t>스크롤위치가 최하단에 </a:t>
+            </a:r>
+            <a:r>
+              <a:rPr lang="ko-KR" altLang="en-US" sz="1800" dirty="0" err="1">
+                <a:solidFill>
+                  <a:srgbClr val="3F7F5F"/>
+                </a:solidFill>
+                <a:latin typeface="Consolas" panose="020B0609020204030204" pitchFamily="49" charset="0"/>
+              </a:rPr>
+              <a:t>위치할때</a:t>
+            </a:r>
+            <a:r>
+              <a:rPr lang="ko-KR" altLang="en-US" sz="1800" dirty="0">
+                <a:solidFill>
+                  <a:srgbClr val="3F7F5F"/>
+                </a:solidFill>
+                <a:latin typeface="Consolas" panose="020B0609020204030204" pitchFamily="49" charset="0"/>
+              </a:rPr>
+              <a:t> 마다 </a:t>
+            </a:r>
+            <a:r>
+              <a:rPr lang="en-US" altLang="ko-KR" sz="1800" dirty="0">
+                <a:solidFill>
+                  <a:srgbClr val="3F7F5F"/>
+                </a:solidFill>
+                <a:latin typeface="Consolas" panose="020B0609020204030204" pitchFamily="49" charset="0"/>
+              </a:rPr>
+              <a:t>++page -&gt; </a:t>
+            </a:r>
+            <a:r>
+              <a:rPr lang="ko-KR" altLang="en-US" sz="1800" dirty="0" err="1">
+                <a:solidFill>
+                  <a:srgbClr val="3F7F5F"/>
+                </a:solidFill>
+                <a:latin typeface="Consolas" panose="020B0609020204030204" pitchFamily="49" charset="0"/>
+              </a:rPr>
+              <a:t>현재페이지값으로</a:t>
+            </a:r>
+            <a:r>
+              <a:rPr lang="ko-KR" altLang="en-US" sz="1800" dirty="0">
+                <a:solidFill>
+                  <a:srgbClr val="3F7F5F"/>
+                </a:solidFill>
+                <a:latin typeface="Consolas" panose="020B0609020204030204" pitchFamily="49" charset="0"/>
+              </a:rPr>
+              <a:t> 요청</a:t>
             </a:r>
           </a:p>
           <a:p>
             <a:pPr algn="l"/>
             <a:r>
-              <a:rPr lang="ko-KR" altLang="en-US" b="0" i="0" dirty="0">
-                <a:solidFill>
-                  <a:srgbClr val="5C5C5C"/>
-                </a:solidFill>
-                <a:effectLst/>
-                <a:latin typeface="Spoqa Han Sans"/>
-              </a:rPr>
-              <a:t>목록이 누적되는 방식으로 하고싶은데 </a:t>
-            </a:r>
-            <a:r>
-              <a:rPr lang="ko-KR" altLang="en-US" b="0" i="0" dirty="0" err="1">
-                <a:solidFill>
-                  <a:srgbClr val="5C5C5C"/>
-                </a:solidFill>
-                <a:effectLst/>
-                <a:latin typeface="Spoqa Han Sans"/>
-              </a:rPr>
-              <a:t>리액트</a:t>
-            </a:r>
-            <a:r>
-              <a:rPr lang="ko-KR" altLang="en-US" b="0" i="0" dirty="0">
-                <a:solidFill>
-                  <a:srgbClr val="5C5C5C"/>
-                </a:solidFill>
-                <a:effectLst/>
-                <a:latin typeface="Spoqa Han Sans"/>
-              </a:rPr>
-              <a:t> 없이 저희가 구현할 수 있을까요</a:t>
-            </a:r>
-            <a:r>
-              <a:rPr lang="en-US" altLang="ko-KR" b="0" i="0" dirty="0">
-                <a:solidFill>
-                  <a:srgbClr val="5C5C5C"/>
-                </a:solidFill>
-                <a:effectLst/>
-                <a:latin typeface="Spoqa Han Sans"/>
-              </a:rPr>
-              <a:t>?</a:t>
-            </a:r>
-          </a:p>
-          <a:p>
+              <a:rPr lang="en-US" altLang="ko-KR" sz="1800" dirty="0">
+                <a:solidFill>
+                  <a:srgbClr val="3F7F5F"/>
+                </a:solidFill>
+                <a:latin typeface="Consolas" panose="020B0609020204030204" pitchFamily="49" charset="0"/>
+              </a:rPr>
+              <a:t> </a:t>
+            </a:r>
+            <a:r>
+              <a:rPr lang="en-US" altLang="ko-KR" sz="1800" u="sng" dirty="0">
+                <a:solidFill>
+                  <a:srgbClr val="3F7F5F"/>
+                </a:solidFill>
+                <a:latin typeface="Consolas" panose="020B0609020204030204" pitchFamily="49" charset="0"/>
+              </a:rPr>
+              <a:t>var page = 1;</a:t>
+            </a:r>
+          </a:p>
+          <a:p>
+            <a:pPr algn="l"/>
+            <a:r>
+              <a:rPr lang="en-US" altLang="ko-KR" sz="1800" dirty="0">
+                <a:solidFill>
+                  <a:srgbClr val="3F7F5F"/>
+                </a:solidFill>
+                <a:latin typeface="Consolas" panose="020B0609020204030204" pitchFamily="49" charset="0"/>
+              </a:rPr>
+              <a:t>$(window).scroll(function() {</a:t>
+            </a:r>
+          </a:p>
+          <a:p>
+            <a:pPr algn="l"/>
+            <a:r>
+              <a:rPr lang="en-US" altLang="ko-KR" sz="1800" dirty="0">
+                <a:solidFill>
+                  <a:srgbClr val="3F7F5F"/>
+                </a:solidFill>
+                <a:latin typeface="Consolas" panose="020B0609020204030204" pitchFamily="49" charset="0"/>
+              </a:rPr>
+              <a:t>    if ($(window).</a:t>
+            </a:r>
+            <a:r>
+              <a:rPr lang="en-US" altLang="ko-KR" sz="1800" dirty="0" err="1">
+                <a:solidFill>
+                  <a:srgbClr val="3F7F5F"/>
+                </a:solidFill>
+                <a:latin typeface="Consolas" panose="020B0609020204030204" pitchFamily="49" charset="0"/>
+              </a:rPr>
+              <a:t>scrollTop</a:t>
+            </a:r>
+            <a:r>
+              <a:rPr lang="en-US" altLang="ko-KR" sz="1800" dirty="0">
+                <a:solidFill>
+                  <a:srgbClr val="3F7F5F"/>
+                </a:solidFill>
+                <a:latin typeface="Consolas" panose="020B0609020204030204" pitchFamily="49" charset="0"/>
+              </a:rPr>
+              <a:t>() == $(document).height() - $(window).height()) {</a:t>
+            </a:r>
+          </a:p>
+          <a:p>
+            <a:pPr algn="l"/>
+            <a:r>
+              <a:rPr lang="en-US" altLang="ko-KR" sz="1800" dirty="0">
+                <a:solidFill>
+                  <a:srgbClr val="3F7F5F"/>
+                </a:solidFill>
+                <a:latin typeface="Consolas" panose="020B0609020204030204" pitchFamily="49" charset="0"/>
+              </a:rPr>
+              <a:t>      ++page;</a:t>
+            </a:r>
+          </a:p>
+          <a:p>
+            <a:pPr algn="l"/>
+            <a:r>
+              <a:rPr lang="en-US" altLang="ko-KR" sz="1800" dirty="0">
+                <a:solidFill>
+                  <a:srgbClr val="3F7F5F"/>
+                </a:solidFill>
+                <a:latin typeface="Consolas" panose="020B0609020204030204" pitchFamily="49" charset="0"/>
+              </a:rPr>
+              <a:t>      $(input[name=</a:t>
+            </a:r>
+            <a:r>
+              <a:rPr lang="en-US" altLang="ko-KR" sz="1800" dirty="0" err="1">
+                <a:solidFill>
+                  <a:srgbClr val="3F7F5F"/>
+                </a:solidFill>
+                <a:latin typeface="Consolas" panose="020B0609020204030204" pitchFamily="49" charset="0"/>
+              </a:rPr>
+              <a:t>currentPage</a:t>
+            </a:r>
+            <a:r>
+              <a:rPr lang="en-US" altLang="ko-KR" sz="1800" dirty="0">
+                <a:solidFill>
+                  <a:srgbClr val="3F7F5F"/>
+                </a:solidFill>
+                <a:latin typeface="Consolas" panose="020B0609020204030204" pitchFamily="49" charset="0"/>
+              </a:rPr>
+              <a:t>]).</a:t>
+            </a:r>
+            <a:r>
+              <a:rPr lang="en-US" altLang="ko-KR" sz="1800" u="sng" dirty="0" err="1">
+                <a:solidFill>
+                  <a:srgbClr val="3F7F5F"/>
+                </a:solidFill>
+                <a:latin typeface="Consolas" panose="020B0609020204030204" pitchFamily="49" charset="0"/>
+              </a:rPr>
+              <a:t>val</a:t>
+            </a:r>
+            <a:r>
+              <a:rPr lang="en-US" altLang="ko-KR" sz="1800" u="sng" dirty="0">
+                <a:solidFill>
+                  <a:srgbClr val="3F7F5F"/>
+                </a:solidFill>
+                <a:latin typeface="Consolas" panose="020B0609020204030204" pitchFamily="49" charset="0"/>
+              </a:rPr>
+              <a:t>(page);</a:t>
+            </a:r>
+          </a:p>
+          <a:p>
+            <a:pPr algn="l"/>
+            <a:r>
+              <a:rPr lang="ko-KR" altLang="en-US" sz="1800" dirty="0">
+                <a:solidFill>
+                  <a:srgbClr val="3F7F5F"/>
+                </a:solidFill>
+                <a:latin typeface="Consolas" panose="020B0609020204030204" pitchFamily="49" charset="0"/>
+              </a:rPr>
+              <a:t>       폼데이터 </a:t>
+            </a:r>
+            <a:r>
+              <a:rPr lang="en-US" altLang="ko-KR" sz="1800" u="sng" dirty="0">
+                <a:solidFill>
+                  <a:srgbClr val="3F7F5F"/>
+                </a:solidFill>
+                <a:latin typeface="Consolas" panose="020B0609020204030204" pitchFamily="49" charset="0"/>
+              </a:rPr>
+              <a:t>ajax </a:t>
+            </a:r>
+            <a:r>
+              <a:rPr lang="ko-KR" altLang="en-US" sz="1800" u="sng" dirty="0">
+                <a:solidFill>
+                  <a:srgbClr val="3F7F5F"/>
+                </a:solidFill>
+                <a:latin typeface="Consolas" panose="020B0609020204030204" pitchFamily="49" charset="0"/>
+              </a:rPr>
+              <a:t>요청 </a:t>
+            </a:r>
+          </a:p>
+          <a:p>
+            <a:pPr algn="l"/>
+            <a:r>
+              <a:rPr lang="en-US" altLang="ko-KR" sz="1800" dirty="0">
+                <a:solidFill>
+                  <a:srgbClr val="3F7F5F"/>
+                </a:solidFill>
+                <a:latin typeface="Consolas" panose="020B0609020204030204" pitchFamily="49" charset="0"/>
+              </a:rPr>
+              <a:t>       </a:t>
+            </a:r>
+            <a:r>
+              <a:rPr lang="en-US" altLang="ko-KR" sz="1800" dirty="0" err="1">
+                <a:solidFill>
+                  <a:srgbClr val="3F7F5F"/>
+                </a:solidFill>
+                <a:latin typeface="Consolas" panose="020B0609020204030204" pitchFamily="49" charset="0"/>
+              </a:rPr>
+              <a:t>divHtml</a:t>
+            </a:r>
+            <a:r>
+              <a:rPr lang="en-US" altLang="ko-KR" sz="1800" dirty="0">
+                <a:solidFill>
+                  <a:srgbClr val="3F7F5F"/>
+                </a:solidFill>
+                <a:latin typeface="Consolas" panose="020B0609020204030204" pitchFamily="49" charset="0"/>
+              </a:rPr>
+              <a:t>+=</a:t>
+            </a:r>
+            <a:r>
+              <a:rPr lang="en-US" altLang="ko-KR" sz="1800" u="sng" dirty="0">
+                <a:solidFill>
+                  <a:srgbClr val="3F7F5F"/>
+                </a:solidFill>
+                <a:latin typeface="Consolas" panose="020B0609020204030204" pitchFamily="49" charset="0"/>
+              </a:rPr>
+              <a:t>&lt;div&gt;~~~</a:t>
+            </a:r>
+          </a:p>
+          <a:p>
+            <a:pPr algn="l"/>
+            <a:r>
+              <a:rPr lang="en-US" altLang="ko-KR" sz="1800" dirty="0">
+                <a:solidFill>
+                  <a:srgbClr val="3F7F5F"/>
+                </a:solidFill>
+                <a:latin typeface="Consolas" panose="020B0609020204030204" pitchFamily="49" charset="0"/>
+              </a:rPr>
+              <a:t>      $("#section").append(</a:t>
+            </a:r>
+            <a:r>
+              <a:rPr lang="en-US" altLang="ko-KR" sz="1800" dirty="0" err="1">
+                <a:solidFill>
+                  <a:srgbClr val="3F7F5F"/>
+                </a:solidFill>
+                <a:latin typeface="Consolas" panose="020B0609020204030204" pitchFamily="49" charset="0"/>
+              </a:rPr>
+              <a:t>divHtml</a:t>
+            </a:r>
+            <a:r>
+              <a:rPr lang="en-US" altLang="ko-KR" sz="1800" dirty="0">
+                <a:solidFill>
+                  <a:srgbClr val="3F7F5F"/>
+                </a:solidFill>
+                <a:latin typeface="Consolas" panose="020B0609020204030204" pitchFamily="49" charset="0"/>
+              </a:rPr>
+              <a:t>);</a:t>
+            </a:r>
+          </a:p>
+          <a:p>
+            <a:pPr algn="l"/>
+            <a:r>
+              <a:rPr lang="ko-KR" altLang="en-US" sz="1800" dirty="0">
+                <a:solidFill>
+                  <a:srgbClr val="3F7F5F"/>
+                </a:solidFill>
+                <a:latin typeface="Consolas" panose="020B0609020204030204" pitchFamily="49" charset="0"/>
+              </a:rPr>
+              <a:t>    </a:t>
+            </a:r>
+            <a:r>
+              <a:rPr lang="en-US" altLang="ko-KR" sz="1800" dirty="0">
+                <a:solidFill>
+                  <a:srgbClr val="3F7F5F"/>
+                </a:solidFill>
+                <a:latin typeface="Consolas" panose="020B0609020204030204" pitchFamily="49" charset="0"/>
+              </a:rPr>
+              <a:t>}</a:t>
+            </a:r>
+          </a:p>
+          <a:p>
+            <a:pPr algn="l"/>
+            <a:r>
+              <a:rPr lang="en-US" altLang="ko-KR" sz="1800">
+                <a:solidFill>
+                  <a:srgbClr val="3F7F5F"/>
+                </a:solidFill>
+                <a:latin typeface="Consolas" panose="020B0609020204030204" pitchFamily="49" charset="0"/>
+              </a:rPr>
+              <a:t>});</a:t>
+            </a:r>
             <a:endParaRPr lang="ko-KR" altLang="en-US" dirty="0"/>
           </a:p>
         </p:txBody>
@@ -7130,7 +7759,7 @@
           <a:p>
             <a:fld id="{29A9B667-C634-5647-8270-27EA227E4EF4}" type="datetimeFigureOut">
               <a:rPr kumimoji="1" lang="ko-US" altLang="en-US" smtClean="0"/>
-              <a:t>08/20/2021</a:t>
+              <a:t>08/21/2021</a:t>
             </a:fld>
             <a:endParaRPr kumimoji="1" lang="ko-US" altLang="en-US"/>
           </a:p>
@@ -7300,7 +7929,7 @@
           <a:p>
             <a:fld id="{29A9B667-C634-5647-8270-27EA227E4EF4}" type="datetimeFigureOut">
               <a:rPr kumimoji="1" lang="ko-US" altLang="en-US" smtClean="0"/>
-              <a:t>08/20/2021</a:t>
+              <a:t>08/21/2021</a:t>
             </a:fld>
             <a:endParaRPr kumimoji="1" lang="ko-US" altLang="en-US"/>
           </a:p>
@@ -7480,7 +8109,7 @@
           <a:p>
             <a:fld id="{29A9B667-C634-5647-8270-27EA227E4EF4}" type="datetimeFigureOut">
               <a:rPr kumimoji="1" lang="ko-US" altLang="en-US" smtClean="0"/>
-              <a:t>08/20/2021</a:t>
+              <a:t>08/21/2021</a:t>
             </a:fld>
             <a:endParaRPr kumimoji="1" lang="ko-US" altLang="en-US"/>
           </a:p>
@@ -7650,7 +8279,7 @@
           <a:p>
             <a:fld id="{29A9B667-C634-5647-8270-27EA227E4EF4}" type="datetimeFigureOut">
               <a:rPr kumimoji="1" lang="ko-US" altLang="en-US" smtClean="0"/>
-              <a:t>08/20/2021</a:t>
+              <a:t>08/21/2021</a:t>
             </a:fld>
             <a:endParaRPr kumimoji="1" lang="ko-US" altLang="en-US"/>
           </a:p>
@@ -7894,7 +8523,7 @@
           <a:p>
             <a:fld id="{29A9B667-C634-5647-8270-27EA227E4EF4}" type="datetimeFigureOut">
               <a:rPr kumimoji="1" lang="ko-US" altLang="en-US" smtClean="0"/>
-              <a:t>08/20/2021</a:t>
+              <a:t>08/21/2021</a:t>
             </a:fld>
             <a:endParaRPr kumimoji="1" lang="ko-US" altLang="en-US"/>
           </a:p>
@@ -8126,7 +8755,7 @@
           <a:p>
             <a:fld id="{29A9B667-C634-5647-8270-27EA227E4EF4}" type="datetimeFigureOut">
               <a:rPr kumimoji="1" lang="ko-US" altLang="en-US" smtClean="0"/>
-              <a:t>08/20/2021</a:t>
+              <a:t>08/21/2021</a:t>
             </a:fld>
             <a:endParaRPr kumimoji="1" lang="ko-US" altLang="en-US"/>
           </a:p>
@@ -8493,7 +9122,7 @@
           <a:p>
             <a:fld id="{29A9B667-C634-5647-8270-27EA227E4EF4}" type="datetimeFigureOut">
               <a:rPr kumimoji="1" lang="ko-US" altLang="en-US" smtClean="0"/>
-              <a:t>08/20/2021</a:t>
+              <a:t>08/21/2021</a:t>
             </a:fld>
             <a:endParaRPr kumimoji="1" lang="ko-US" altLang="en-US"/>
           </a:p>
@@ -8611,7 +9240,7 @@
           <a:p>
             <a:fld id="{29A9B667-C634-5647-8270-27EA227E4EF4}" type="datetimeFigureOut">
               <a:rPr kumimoji="1" lang="ko-US" altLang="en-US" smtClean="0"/>
-              <a:t>08/20/2021</a:t>
+              <a:t>08/21/2021</a:t>
             </a:fld>
             <a:endParaRPr kumimoji="1" lang="ko-US" altLang="en-US"/>
           </a:p>
@@ -8706,7 +9335,7 @@
           <a:p>
             <a:fld id="{29A9B667-C634-5647-8270-27EA227E4EF4}" type="datetimeFigureOut">
               <a:rPr kumimoji="1" lang="ko-US" altLang="en-US" smtClean="0"/>
-              <a:t>08/20/2021</a:t>
+              <a:t>08/21/2021</a:t>
             </a:fld>
             <a:endParaRPr kumimoji="1" lang="ko-US" altLang="en-US"/>
           </a:p>
@@ -8983,7 +9612,7 @@
           <a:p>
             <a:fld id="{29A9B667-C634-5647-8270-27EA227E4EF4}" type="datetimeFigureOut">
               <a:rPr kumimoji="1" lang="ko-US" altLang="en-US" smtClean="0"/>
-              <a:t>08/20/2021</a:t>
+              <a:t>08/21/2021</a:t>
             </a:fld>
             <a:endParaRPr kumimoji="1" lang="ko-US" altLang="en-US"/>
           </a:p>
@@ -9240,7 +9869,7 @@
           <a:p>
             <a:fld id="{29A9B667-C634-5647-8270-27EA227E4EF4}" type="datetimeFigureOut">
               <a:rPr kumimoji="1" lang="ko-US" altLang="en-US" smtClean="0"/>
-              <a:t>08/20/2021</a:t>
+              <a:t>08/21/2021</a:t>
             </a:fld>
             <a:endParaRPr kumimoji="1" lang="ko-US" altLang="en-US"/>
           </a:p>
@@ -9453,7 +10082,7 @@
           <a:p>
             <a:fld id="{29A9B667-C634-5647-8270-27EA227E4EF4}" type="datetimeFigureOut">
               <a:rPr kumimoji="1" lang="ko-US" altLang="en-US" smtClean="0"/>
-              <a:t>08/20/2021</a:t>
+              <a:t>08/21/2021</a:t>
             </a:fld>
             <a:endParaRPr kumimoji="1" lang="ko-US" altLang="en-US"/>
           </a:p>

</xml_diff>